<commit_message>
Minor changes to data source
</commit_message>
<xml_diff>
--- a/Workshops/Workshop1.pptx
+++ b/Workshops/Workshop1.pptx
@@ -5641,7 +5641,7 @@
       </p:sp>
       <p:pic>
         <p:nvPicPr>
-          <p:cNvPr descr="Images/RConsole.png" id="0" name="Picture 1"/>
+          <p:cNvPr descr="../Images/RConsole.png" id="0" name="Picture 1"/>
           <p:cNvPicPr>
             <a:picLocks noGrp="1" noChangeAspect="1"/>
           </p:cNvPicPr>
@@ -5812,7 +5812,7 @@
       </p:sp>
       <p:pic>
         <p:nvPicPr>
-          <p:cNvPr descr="Images/RStudio.png" id="0" name="Picture 1"/>
+          <p:cNvPr descr="../Images/RStudio.png" id="0" name="Picture 1"/>
           <p:cNvPicPr>
             <a:picLocks noGrp="1" noChangeAspect="1"/>
           </p:cNvPicPr>
@@ -5935,7 +5935,7 @@
       </p:sp>
       <p:pic>
         <p:nvPicPr>
-          <p:cNvPr descr="Images/RStudioHighlightWindows.png" id="0" name="Picture 1"/>
+          <p:cNvPr descr="../Images/RStudioHighlightWindows.png" id="0" name="Picture 1"/>
           <p:cNvPicPr>
             <a:picLocks noGrp="1" noChangeAspect="1"/>
           </p:cNvPicPr>
@@ -6050,7 +6050,7 @@
       </p:sp>
       <p:pic>
         <p:nvPicPr>
-          <p:cNvPr descr="Images/RStudioButtonsHighlighted.png" id="0" name="Picture 1"/>
+          <p:cNvPr descr="../Images/RStudioButtonsHighlighted.png" id="0" name="Picture 1"/>
           <p:cNvPicPr>
             <a:picLocks noGrp="1" noChangeAspect="1"/>
           </p:cNvPicPr>
@@ -6157,7 +6157,7 @@
       </p:sp>
       <p:pic>
         <p:nvPicPr>
-          <p:cNvPr descr="Images/RStudioConsole.png" id="0" name="Picture 1"/>
+          <p:cNvPr descr="../Images/RStudioConsole.png" id="0" name="Picture 1"/>
           <p:cNvPicPr>
             <a:picLocks noGrp="1" noChangeAspect="1"/>
           </p:cNvPicPr>
@@ -6616,7 +6616,7 @@
       </p:sp>
       <p:pic>
         <p:nvPicPr>
-          <p:cNvPr descr="Images/RStudioSource.png" id="0" name="Picture 1"/>
+          <p:cNvPr descr="../Images/RStudioSource.png" id="0" name="Picture 1"/>
           <p:cNvPicPr>
             <a:picLocks noGrp="1" noChangeAspect="1"/>
           </p:cNvPicPr>
@@ -7021,7 +7021,7 @@
       </p:grpSpPr>
       <p:pic>
         <p:nvPicPr>
-          <p:cNvPr descr="Images/Clinician%20Coders%20Branding_FINAL_CMYK_Colour.png" id="0" name="Picture 1"/>
+          <p:cNvPr descr="../Images/Clinician%20Coders%20Branding_FINAL_CMYK_Colour.png" id="0" name="Picture 1"/>
           <p:cNvPicPr>
             <a:picLocks noGrp="1" noChangeAspect="1"/>
           </p:cNvPicPr>
@@ -11074,7 +11074,7 @@
       </p:sp>
       <p:pic>
         <p:nvPicPr>
-          <p:cNvPr descr="Images/Function1.png" id="0" name="Picture 1"/>
+          <p:cNvPr descr="../Images/Function1.png" id="0" name="Picture 1"/>
           <p:cNvPicPr>
             <a:picLocks noGrp="1" noChangeAspect="1"/>
           </p:cNvPicPr>
@@ -11173,7 +11173,7 @@
       </p:sp>
       <p:pic>
         <p:nvPicPr>
-          <p:cNvPr descr="Images/Function2.png" id="0" name="Picture 1"/>
+          <p:cNvPr descr="../Images/Function2.png" id="0" name="Picture 1"/>
           <p:cNvPicPr>
             <a:picLocks noGrp="1" noChangeAspect="1"/>
           </p:cNvPicPr>
@@ -11375,7 +11375,7 @@
       </p:sp>
       <p:pic>
         <p:nvPicPr>
-          <p:cNvPr descr="Images/Function3.png" id="0" name="Picture 1"/>
+          <p:cNvPr descr="../Images/Function3.png" id="0" name="Picture 1"/>
           <p:cNvPicPr>
             <a:picLocks noGrp="1" noChangeAspect="1"/>
           </p:cNvPicPr>
@@ -11617,7 +11617,7 @@
       </p:sp>
       <p:pic>
         <p:nvPicPr>
-          <p:cNvPr descr="Images/Function4.png" id="0" name="Picture 1"/>
+          <p:cNvPr descr="../Images/Function4.png" id="0" name="Picture 1"/>
           <p:cNvPicPr>
             <a:picLocks noGrp="1" noChangeAspect="1"/>
           </p:cNvPicPr>
@@ -12537,7 +12537,7 @@
       </p:sp>
       <p:pic>
         <p:nvPicPr>
-          <p:cNvPr descr="Images/HelpPage.png" id="0" name="Picture 1"/>
+          <p:cNvPr descr="../Images/HelpPage.png" id="0" name="Picture 1"/>
           <p:cNvPicPr>
             <a:picLocks noGrp="1" noChangeAspect="1"/>
           </p:cNvPicPr>
@@ -13738,7 +13738,7 @@
       </p:sp>
       <p:pic>
         <p:nvPicPr>
-          <p:cNvPr descr="Images/Pipeline.png" id="0" name="Picture 1"/>
+          <p:cNvPr descr="../Images/Pipeline.png" id="0" name="Picture 1"/>
           <p:cNvPicPr>
             <a:picLocks noGrp="1" noChangeAspect="1"/>
           </p:cNvPicPr>

</xml_diff>

<commit_message>
fixed error in workshop1
</commit_message>
<xml_diff>
--- a/Workshops/Workshop1.pptx
+++ b/Workshops/Workshop1.pptx
@@ -702,6 +702,176 @@
 </p:notes>
 </file>
 
+<file path=ppt/notesSlides/notesSlide10.xml><?xml version="1.0" encoding="utf-8"?>
+<p:notes xmlns:a="http://schemas.openxmlformats.org/drawingml/2006/main" xmlns:r="http://schemas.openxmlformats.org/officeDocument/2006/relationships" xmlns:p="http://schemas.openxmlformats.org/presentationml/2006/main">
+  <p:cSld>
+    <p:spTree>
+      <p:nvGrpSpPr>
+        <p:cNvPr id="1" name=""/>
+        <p:cNvGrpSpPr/>
+        <p:nvPr/>
+      </p:nvGrpSpPr>
+      <p:grpSpPr>
+        <a:xfrm>
+          <a:off x="0" y="0"/>
+          <a:ext cx="0" cy="0"/>
+          <a:chOff x="0" y="0"/>
+          <a:chExt cx="0" cy="0"/>
+        </a:xfrm>
+      </p:grpSpPr>
+      <p:sp>
+        <p:nvSpPr>
+          <p:cNvPr id="2" name="Slide Image Placeholder 1"/>
+          <p:cNvSpPr>
+            <a:spLocks noGrp="1" noRot="1" noChangeAspect="1"/>
+          </p:cNvSpPr>
+          <p:nvPr>
+            <p:ph type="sldImg"/>
+          </p:nvPr>
+        </p:nvSpPr>
+        <p:spPr/>
+      </p:sp>
+      <p:sp>
+        <p:nvSpPr>
+          <p:cNvPr id="3" name="Notes Placeholder 2"/>
+          <p:cNvSpPr>
+            <a:spLocks noGrp="1"/>
+          </p:cNvSpPr>
+          <p:nvPr>
+            <p:ph type="body" idx="1"/>
+          </p:nvPr>
+        </p:nvSpPr>
+        <p:spPr/>
+        <p:txBody>
+          <a:bodyPr/>
+          <a:lstStyle/>
+          <a:p>
+            <a:pPr lvl="0" marL="0" indent="0">
+              <a:buNone/>
+            </a:pPr>
+            <a:r>
+              <a:rPr/>
+              <a:t>Maybe</a:t>
+            </a:r>
+            <a:r>
+              <a:rPr/>
+              <a:t> </a:t>
+            </a:r>
+            <a:r>
+              <a:rPr/>
+              <a:t>mention</a:t>
+            </a:r>
+            <a:r>
+              <a:rPr/>
+              <a:t> </a:t>
+            </a:r>
+            <a:r>
+              <a:rPr/>
+              <a:t>that</a:t>
+            </a:r>
+            <a:r>
+              <a:rPr/>
+              <a:t> </a:t>
+            </a:r>
+            <a:r>
+              <a:rPr/>
+              <a:t>a</a:t>
+            </a:r>
+            <a:r>
+              <a:rPr/>
+              <a:t> </a:t>
+            </a:r>
+            <a:r>
+              <a:rPr/>
+              <a:t>few</a:t>
+            </a:r>
+            <a:r>
+              <a:rPr/>
+              <a:t> </a:t>
+            </a:r>
+            <a:r>
+              <a:rPr/>
+              <a:t>of</a:t>
+            </a:r>
+            <a:r>
+              <a:rPr/>
+              <a:t> </a:t>
+            </a:r>
+            <a:r>
+              <a:rPr/>
+              <a:t>these</a:t>
+            </a:r>
+            <a:r>
+              <a:rPr/>
+              <a:t> </a:t>
+            </a:r>
+            <a:r>
+              <a:rPr/>
+              <a:t>packages</a:t>
+            </a:r>
+            <a:r>
+              <a:rPr/>
+              <a:t> </a:t>
+            </a:r>
+            <a:r>
+              <a:rPr/>
+              <a:t>are</a:t>
+            </a:r>
+            <a:r>
+              <a:rPr/>
+              <a:t> </a:t>
+            </a:r>
+            <a:r>
+              <a:rPr/>
+              <a:t>loaded</a:t>
+            </a:r>
+            <a:r>
+              <a:rPr/>
+              <a:t> </a:t>
+            </a:r>
+            <a:r>
+              <a:rPr/>
+              <a:t>with</a:t>
+            </a:r>
+            <a:r>
+              <a:rPr/>
+              <a:t> </a:t>
+            </a:r>
+            <a:r>
+              <a:rPr/>
+              <a:t>tidyverse.</a:t>
+            </a:r>
+          </a:p>
+        </p:txBody>
+      </p:sp>
+      <p:sp>
+        <p:nvSpPr>
+          <p:cNvPr id="4" name="Slide Number Placeholder 3"/>
+          <p:cNvSpPr>
+            <a:spLocks noGrp="1"/>
+          </p:cNvSpPr>
+          <p:nvPr>
+            <p:ph type="sldNum" sz="quarter" idx="10"/>
+          </p:nvPr>
+        </p:nvSpPr>
+        <p:spPr/>
+        <p:txBody>
+          <a:bodyPr/>
+          <a:lstStyle/>
+          <a:p>
+            <a:fld id="{18BDFEC3-8487-43E8-A154-7C12CBC1FFF2}" type="slidenum">
+              <a:rPr lang="en-US"/>
+              <a:t>52</a:t>
+            </a:fld>
+            <a:endParaRPr lang="en-US"/>
+          </a:p>
+        </p:txBody>
+      </p:sp>
+    </p:spTree>
+  </p:cSld>
+</p:notes>
+</file>
+
 <file path=ppt/notesSlides/notesSlide2.xml><?xml version="1.0" encoding="utf-8"?>
 <p:notes xmlns:a="http://schemas.openxmlformats.org/drawingml/2006/main" xmlns:r="http://schemas.openxmlformats.org/officeDocument/2006/relationships" xmlns:p="http://schemas.openxmlformats.org/presentationml/2006/main">
   <p:cSld>
@@ -1387,39 +1557,247 @@
             </a:pPr>
             <a:r>
               <a:rPr/>
-              <a:t>Get</a:t>
-            </a:r>
-            <a:r>
-              <a:rPr/>
-              <a:t> </a:t>
-            </a:r>
-            <a:r>
-              <a:rPr/>
-              <a:t>them</a:t>
-            </a:r>
-            <a:r>
-              <a:rPr/>
-              <a:t> </a:t>
-            </a:r>
-            <a:r>
-              <a:rPr/>
-              <a:t>to</a:t>
-            </a:r>
-            <a:r>
-              <a:rPr/>
-              <a:t> </a:t>
-            </a:r>
-            <a:r>
-              <a:rPr/>
-              <a:t>do</a:t>
-            </a:r>
-            <a:r>
-              <a:rPr/>
-              <a:t> </a:t>
-            </a:r>
-            <a:r>
-              <a:rPr/>
-              <a:t>this.</a:t>
+              <a:t>Say</a:t>
+            </a:r>
+            <a:r>
+              <a:rPr/>
+              <a:t> </a:t>
+            </a:r>
+            <a:r>
+              <a:rPr/>
+              <a:t>that</a:t>
+            </a:r>
+            <a:r>
+              <a:rPr/>
+              <a:t> </a:t>
+            </a:r>
+            <a:r>
+              <a:rPr/>
+              <a:t>the</a:t>
+            </a:r>
+            <a:r>
+              <a:rPr/>
+              <a:t> </a:t>
+            </a:r>
+            <a:r>
+              <a:rPr/>
+              <a:t>##</a:t>
+            </a:r>
+            <a:r>
+              <a:rPr/>
+              <a:t> </a:t>
+            </a:r>
+            <a:r>
+              <a:rPr/>
+              <a:t>sign</a:t>
+            </a:r>
+            <a:r>
+              <a:rPr/>
+              <a:t> </a:t>
+            </a:r>
+            <a:r>
+              <a:rPr/>
+              <a:t>is</a:t>
+            </a:r>
+            <a:r>
+              <a:rPr/>
+              <a:t> </a:t>
+            </a:r>
+            <a:r>
+              <a:rPr/>
+              <a:t>just</a:t>
+            </a:r>
+            <a:r>
+              <a:rPr/>
+              <a:t> </a:t>
+            </a:r>
+            <a:r>
+              <a:rPr/>
+              <a:t>printed</a:t>
+            </a:r>
+            <a:r>
+              <a:rPr/>
+              <a:t> </a:t>
+            </a:r>
+            <a:r>
+              <a:rPr/>
+              <a:t>on</a:t>
+            </a:r>
+            <a:r>
+              <a:rPr/>
+              <a:t> </a:t>
+            </a:r>
+            <a:r>
+              <a:rPr/>
+              <a:t>the</a:t>
+            </a:r>
+            <a:r>
+              <a:rPr/>
+              <a:t> </a:t>
+            </a:r>
+            <a:r>
+              <a:rPr/>
+              <a:t>slide</a:t>
+            </a:r>
+            <a:r>
+              <a:rPr/>
+              <a:t> </a:t>
+            </a:r>
+            <a:r>
+              <a:rPr/>
+              <a:t>as</a:t>
+            </a:r>
+            <a:r>
+              <a:rPr/>
+              <a:t> </a:t>
+            </a:r>
+            <a:r>
+              <a:rPr/>
+              <a:t>an</a:t>
+            </a:r>
+            <a:r>
+              <a:rPr/>
+              <a:t> </a:t>
+            </a:r>
+            <a:r>
+              <a:rPr/>
+              <a:t>indicator</a:t>
+            </a:r>
+            <a:r>
+              <a:rPr/>
+              <a:t> </a:t>
+            </a:r>
+            <a:r>
+              <a:rPr/>
+              <a:t>that</a:t>
+            </a:r>
+            <a:r>
+              <a:rPr/>
+              <a:t> </a:t>
+            </a:r>
+            <a:r>
+              <a:rPr/>
+              <a:t>we</a:t>
+            </a:r>
+            <a:r>
+              <a:rPr/>
+              <a:t> </a:t>
+            </a:r>
+            <a:r>
+              <a:rPr/>
+              <a:t>are</a:t>
+            </a:r>
+            <a:r>
+              <a:rPr/>
+              <a:t> </a:t>
+            </a:r>
+            <a:r>
+              <a:rPr/>
+              <a:t>seeing</a:t>
+            </a:r>
+            <a:r>
+              <a:rPr/>
+              <a:t> </a:t>
+            </a:r>
+            <a:r>
+              <a:rPr/>
+              <a:t>output</a:t>
+            </a:r>
+            <a:r>
+              <a:rPr/>
+              <a:t> </a:t>
+            </a:r>
+            <a:r>
+              <a:rPr/>
+              <a:t>rather</a:t>
+            </a:r>
+            <a:r>
+              <a:rPr/>
+              <a:t> </a:t>
+            </a:r>
+            <a:r>
+              <a:rPr/>
+              <a:t>than</a:t>
+            </a:r>
+            <a:r>
+              <a:rPr/>
+              <a:t> </a:t>
+            </a:r>
+            <a:r>
+              <a:rPr/>
+              <a:t>code</a:t>
+            </a:r>
+            <a:r>
+              <a:rPr/>
+              <a:t> </a:t>
+            </a:r>
+            <a:r>
+              <a:rPr/>
+              <a:t>entered.</a:t>
+            </a:r>
+            <a:r>
+              <a:rPr/>
+              <a:t> </a:t>
+            </a:r>
+            <a:r>
+              <a:rPr/>
+              <a:t>They</a:t>
+            </a:r>
+            <a:r>
+              <a:rPr/>
+              <a:t> </a:t>
+            </a:r>
+            <a:r>
+              <a:rPr/>
+              <a:t>shouldn’t</a:t>
+            </a:r>
+            <a:r>
+              <a:rPr/>
+              <a:t> </a:t>
+            </a:r>
+            <a:r>
+              <a:rPr/>
+              <a:t>see</a:t>
+            </a:r>
+            <a:r>
+              <a:rPr/>
+              <a:t> </a:t>
+            </a:r>
+            <a:r>
+              <a:rPr/>
+              <a:t>the</a:t>
+            </a:r>
+            <a:r>
+              <a:rPr/>
+              <a:t> </a:t>
+            </a:r>
+            <a:r>
+              <a:rPr/>
+              <a:t>symbol</a:t>
+            </a:r>
+            <a:r>
+              <a:rPr/>
+              <a:t> </a:t>
+            </a:r>
+            <a:r>
+              <a:rPr/>
+              <a:t>on</a:t>
+            </a:r>
+            <a:r>
+              <a:rPr/>
+              <a:t> </a:t>
+            </a:r>
+            <a:r>
+              <a:rPr/>
+              <a:t>their</a:t>
+            </a:r>
+            <a:r>
+              <a:rPr/>
+              <a:t> </a:t>
+            </a:r>
+            <a:r>
+              <a:rPr/>
+              <a:t>consoles.</a:t>
             </a:r>
           </a:p>
         </p:txBody>
@@ -1441,7 +1819,7 @@
           <a:p>
             <a:fld id="{18BDFEC3-8487-43E8-A154-7C12CBC1FFF2}" type="slidenum">
               <a:rPr lang="en-US"/>
-              <a:t>19</a:t>
+              <a:t>16</a:t>
             </a:fld>
             <a:endParaRPr lang="en-US"/>
           </a:p>
@@ -1555,7 +1933,7 @@
           <a:p>
             <a:fld id="{18BDFEC3-8487-43E8-A154-7C12CBC1FFF2}" type="slidenum">
               <a:rPr lang="en-US"/>
-              <a:t>22</a:t>
+              <a:t>19</a:t>
             </a:fld>
             <a:endParaRPr lang="en-US"/>
           </a:p>
@@ -1639,55 +2017,15 @@
             </a:r>
             <a:r>
               <a:rPr/>
-              <a:t>look</a:t>
-            </a:r>
-            <a:r>
-              <a:rPr/>
-              <a:t> </a:t>
-            </a:r>
-            <a:r>
-              <a:rPr/>
-              <a:t>up</a:t>
-            </a:r>
-            <a:r>
-              <a:rPr/>
-              <a:t> </a:t>
-            </a:r>
-            <a:r>
-              <a:rPr/>
-              <a:t>the</a:t>
-            </a:r>
-            <a:r>
-              <a:rPr/>
-              <a:t> </a:t>
-            </a:r>
-            <a:r>
-              <a:rPr/>
-              <a:t>help</a:t>
-            </a:r>
-            <a:r>
-              <a:rPr/>
-              <a:t> </a:t>
-            </a:r>
-            <a:r>
-              <a:rPr/>
-              <a:t>page</a:t>
-            </a:r>
-            <a:r>
-              <a:rPr/>
-              <a:t> </a:t>
-            </a:r>
-            <a:r>
-              <a:rPr/>
-              <a:t>for</a:t>
-            </a:r>
-            <a:r>
-              <a:rPr/>
-              <a:t> </a:t>
-            </a:r>
-            <a:r>
-              <a:rPr/>
-              <a:t>mean</a:t>
+              <a:t>do</a:t>
+            </a:r>
+            <a:r>
+              <a:rPr/>
+              <a:t> </a:t>
+            </a:r>
+            <a:r>
+              <a:rPr/>
+              <a:t>this.</a:t>
             </a:r>
           </a:p>
         </p:txBody>
@@ -1709,7 +2047,7 @@
           <a:p>
             <a:fld id="{18BDFEC3-8487-43E8-A154-7C12CBC1FFF2}" type="slidenum">
               <a:rPr lang="en-US"/>
-              <a:t>47</a:t>
+              <a:t>22</a:t>
             </a:fld>
             <a:endParaRPr lang="en-US"/>
           </a:p>
@@ -1769,39 +2107,79 @@
             </a:pPr>
             <a:r>
               <a:rPr/>
-              <a:t>Work</a:t>
-            </a:r>
-            <a:r>
-              <a:rPr/>
-              <a:t> </a:t>
-            </a:r>
-            <a:r>
-              <a:rPr/>
-              <a:t>through</a:t>
-            </a:r>
-            <a:r>
-              <a:rPr/>
-              <a:t> </a:t>
-            </a:r>
-            <a:r>
-              <a:rPr/>
-              <a:t>this</a:t>
-            </a:r>
-            <a:r>
-              <a:rPr/>
-              <a:t> </a:t>
-            </a:r>
-            <a:r>
-              <a:rPr/>
-              <a:t>with</a:t>
-            </a:r>
-            <a:r>
-              <a:rPr/>
-              <a:t> </a:t>
-            </a:r>
-            <a:r>
-              <a:rPr/>
-              <a:t>them.</a:t>
+              <a:t>Get</a:t>
+            </a:r>
+            <a:r>
+              <a:rPr/>
+              <a:t> </a:t>
+            </a:r>
+            <a:r>
+              <a:rPr/>
+              <a:t>them</a:t>
+            </a:r>
+            <a:r>
+              <a:rPr/>
+              <a:t> </a:t>
+            </a:r>
+            <a:r>
+              <a:rPr/>
+              <a:t>to</a:t>
+            </a:r>
+            <a:r>
+              <a:rPr/>
+              <a:t> </a:t>
+            </a:r>
+            <a:r>
+              <a:rPr/>
+              <a:t>look</a:t>
+            </a:r>
+            <a:r>
+              <a:rPr/>
+              <a:t> </a:t>
+            </a:r>
+            <a:r>
+              <a:rPr/>
+              <a:t>up</a:t>
+            </a:r>
+            <a:r>
+              <a:rPr/>
+              <a:t> </a:t>
+            </a:r>
+            <a:r>
+              <a:rPr/>
+              <a:t>the</a:t>
+            </a:r>
+            <a:r>
+              <a:rPr/>
+              <a:t> </a:t>
+            </a:r>
+            <a:r>
+              <a:rPr/>
+              <a:t>help</a:t>
+            </a:r>
+            <a:r>
+              <a:rPr/>
+              <a:t> </a:t>
+            </a:r>
+            <a:r>
+              <a:rPr/>
+              <a:t>page</a:t>
+            </a:r>
+            <a:r>
+              <a:rPr/>
+              <a:t> </a:t>
+            </a:r>
+            <a:r>
+              <a:rPr/>
+              <a:t>for</a:t>
+            </a:r>
+            <a:r>
+              <a:rPr/>
+              <a:t> </a:t>
+            </a:r>
+            <a:r>
+              <a:rPr/>
+              <a:t>mean</a:t>
             </a:r>
           </a:p>
         </p:txBody>
@@ -1823,7 +2201,7 @@
           <a:p>
             <a:fld id="{18BDFEC3-8487-43E8-A154-7C12CBC1FFF2}" type="slidenum">
               <a:rPr lang="en-US"/>
-              <a:t>50</a:t>
+              <a:t>47</a:t>
             </a:fld>
             <a:endParaRPr lang="en-US"/>
           </a:p>
@@ -1883,55 +2261,15 @@
             </a:pPr>
             <a:r>
               <a:rPr/>
-              <a:t>Get</a:t>
-            </a:r>
-            <a:r>
-              <a:rPr/>
-              <a:t> </a:t>
-            </a:r>
-            <a:r>
-              <a:rPr/>
-              <a:t>them</a:t>
-            </a:r>
-            <a:r>
-              <a:rPr/>
-              <a:t> </a:t>
-            </a:r>
-            <a:r>
-              <a:rPr/>
-              <a:t>to</a:t>
-            </a:r>
-            <a:r>
-              <a:rPr/>
-              <a:t> </a:t>
-            </a:r>
-            <a:r>
-              <a:rPr/>
-              <a:t>load</a:t>
-            </a:r>
-            <a:r>
-              <a:rPr/>
-              <a:t> </a:t>
-            </a:r>
-            <a:r>
-              <a:rPr/>
-              <a:t>tidyverse.</a:t>
-            </a:r>
-            <a:r>
-              <a:rPr/>
-              <a:t> </a:t>
-            </a:r>
-            <a:r>
-              <a:rPr/>
-              <a:t>Emphasise</a:t>
-            </a:r>
-            <a:r>
-              <a:rPr/>
-              <a:t> </a:t>
-            </a:r>
-            <a:r>
-              <a:rPr/>
-              <a:t>that</a:t>
+              <a:t>Work</a:t>
+            </a:r>
+            <a:r>
+              <a:rPr/>
+              <a:t> </a:t>
+            </a:r>
+            <a:r>
+              <a:rPr/>
+              <a:t>through</a:t>
             </a:r>
             <a:r>
               <a:rPr/>
@@ -1947,79 +2285,15 @@
             </a:r>
             <a:r>
               <a:rPr/>
-              <a:t>is</a:t>
-            </a:r>
-            <a:r>
-              <a:rPr/>
-              <a:t> </a:t>
-            </a:r>
-            <a:r>
-              <a:rPr/>
-              <a:t>a</a:t>
-            </a:r>
-            <a:r>
-              <a:rPr/>
-              <a:t> </a:t>
-            </a:r>
-            <a:r>
-              <a:rPr/>
-              <a:t>process</a:t>
-            </a:r>
-            <a:r>
-              <a:rPr/>
-              <a:t> </a:t>
-            </a:r>
-            <a:r>
-              <a:rPr/>
-              <a:t>we</a:t>
-            </a:r>
-            <a:r>
-              <a:rPr/>
-              <a:t> </a:t>
-            </a:r>
-            <a:r>
-              <a:rPr/>
-              <a:t>will</a:t>
-            </a:r>
-            <a:r>
-              <a:rPr/>
-              <a:t> </a:t>
-            </a:r>
-            <a:r>
-              <a:rPr/>
-              <a:t>keep</a:t>
-            </a:r>
-            <a:r>
-              <a:rPr/>
-              <a:t> </a:t>
-            </a:r>
-            <a:r>
-              <a:rPr/>
-              <a:t>repeating</a:t>
-            </a:r>
-            <a:r>
-              <a:rPr/>
-              <a:t> </a:t>
-            </a:r>
-            <a:r>
-              <a:rPr/>
-              <a:t>throughout</a:t>
-            </a:r>
-            <a:r>
-              <a:rPr/>
-              <a:t> </a:t>
-            </a:r>
-            <a:r>
-              <a:rPr/>
-              <a:t>the</a:t>
-            </a:r>
-            <a:r>
-              <a:rPr/>
-              <a:t> </a:t>
-            </a:r>
-            <a:r>
-              <a:rPr/>
-              <a:t>course.</a:t>
+              <a:t>with</a:t>
+            </a:r>
+            <a:r>
+              <a:rPr/>
+              <a:t> </a:t>
+            </a:r>
+            <a:r>
+              <a:rPr/>
+              <a:t>them.</a:t>
             </a:r>
           </a:p>
         </p:txBody>
@@ -2041,7 +2315,7 @@
           <a:p>
             <a:fld id="{18BDFEC3-8487-43E8-A154-7C12CBC1FFF2}" type="slidenum">
               <a:rPr lang="en-US"/>
-              <a:t>51</a:t>
+              <a:t>50</a:t>
             </a:fld>
             <a:endParaRPr lang="en-US"/>
           </a:p>
@@ -2101,15 +2375,47 @@
             </a:pPr>
             <a:r>
               <a:rPr/>
-              <a:t>Maybe</a:t>
-            </a:r>
-            <a:r>
-              <a:rPr/>
-              <a:t> </a:t>
-            </a:r>
-            <a:r>
-              <a:rPr/>
-              <a:t>mention</a:t>
+              <a:t>Get</a:t>
+            </a:r>
+            <a:r>
+              <a:rPr/>
+              <a:t> </a:t>
+            </a:r>
+            <a:r>
+              <a:rPr/>
+              <a:t>them</a:t>
+            </a:r>
+            <a:r>
+              <a:rPr/>
+              <a:t> </a:t>
+            </a:r>
+            <a:r>
+              <a:rPr/>
+              <a:t>to</a:t>
+            </a:r>
+            <a:r>
+              <a:rPr/>
+              <a:t> </a:t>
+            </a:r>
+            <a:r>
+              <a:rPr/>
+              <a:t>load</a:t>
+            </a:r>
+            <a:r>
+              <a:rPr/>
+              <a:t> </a:t>
+            </a:r>
+            <a:r>
+              <a:rPr/>
+              <a:t>tidyverse.</a:t>
+            </a:r>
+            <a:r>
+              <a:rPr/>
+              <a:t> </a:t>
+            </a:r>
+            <a:r>
+              <a:rPr/>
+              <a:t>Emphasise</a:t>
             </a:r>
             <a:r>
               <a:rPr/>
@@ -2125,6 +2431,22 @@
             </a:r>
             <a:r>
               <a:rPr/>
+              <a:t>this</a:t>
+            </a:r>
+            <a:r>
+              <a:rPr/>
+              <a:t> </a:t>
+            </a:r>
+            <a:r>
+              <a:rPr/>
+              <a:t>is</a:t>
+            </a:r>
+            <a:r>
+              <a:rPr/>
+              <a:t> </a:t>
+            </a:r>
+            <a:r>
+              <a:rPr/>
               <a:t>a</a:t>
             </a:r>
             <a:r>
@@ -2133,63 +2455,63 @@
             </a:r>
             <a:r>
               <a:rPr/>
-              <a:t>few</a:t>
-            </a:r>
-            <a:r>
-              <a:rPr/>
-              <a:t> </a:t>
-            </a:r>
-            <a:r>
-              <a:rPr/>
-              <a:t>of</a:t>
-            </a:r>
-            <a:r>
-              <a:rPr/>
-              <a:t> </a:t>
-            </a:r>
-            <a:r>
-              <a:rPr/>
-              <a:t>these</a:t>
-            </a:r>
-            <a:r>
-              <a:rPr/>
-              <a:t> </a:t>
-            </a:r>
-            <a:r>
-              <a:rPr/>
-              <a:t>packages</a:t>
-            </a:r>
-            <a:r>
-              <a:rPr/>
-              <a:t> </a:t>
-            </a:r>
-            <a:r>
-              <a:rPr/>
-              <a:t>are</a:t>
-            </a:r>
-            <a:r>
-              <a:rPr/>
-              <a:t> </a:t>
-            </a:r>
-            <a:r>
-              <a:rPr/>
-              <a:t>loaded</a:t>
-            </a:r>
-            <a:r>
-              <a:rPr/>
-              <a:t> </a:t>
-            </a:r>
-            <a:r>
-              <a:rPr/>
-              <a:t>with</a:t>
-            </a:r>
-            <a:r>
-              <a:rPr/>
-              <a:t> </a:t>
-            </a:r>
-            <a:r>
-              <a:rPr/>
-              <a:t>tidyverse.</a:t>
+              <a:t>process</a:t>
+            </a:r>
+            <a:r>
+              <a:rPr/>
+              <a:t> </a:t>
+            </a:r>
+            <a:r>
+              <a:rPr/>
+              <a:t>we</a:t>
+            </a:r>
+            <a:r>
+              <a:rPr/>
+              <a:t> </a:t>
+            </a:r>
+            <a:r>
+              <a:rPr/>
+              <a:t>will</a:t>
+            </a:r>
+            <a:r>
+              <a:rPr/>
+              <a:t> </a:t>
+            </a:r>
+            <a:r>
+              <a:rPr/>
+              <a:t>keep</a:t>
+            </a:r>
+            <a:r>
+              <a:rPr/>
+              <a:t> </a:t>
+            </a:r>
+            <a:r>
+              <a:rPr/>
+              <a:t>repeating</a:t>
+            </a:r>
+            <a:r>
+              <a:rPr/>
+              <a:t> </a:t>
+            </a:r>
+            <a:r>
+              <a:rPr/>
+              <a:t>throughout</a:t>
+            </a:r>
+            <a:r>
+              <a:rPr/>
+              <a:t> </a:t>
+            </a:r>
+            <a:r>
+              <a:rPr/>
+              <a:t>the</a:t>
+            </a:r>
+            <a:r>
+              <a:rPr/>
+              <a:t> </a:t>
+            </a:r>
+            <a:r>
+              <a:rPr/>
+              <a:t>course.</a:t>
             </a:r>
           </a:p>
         </p:txBody>
@@ -2211,7 +2533,7 @@
           <a:p>
             <a:fld id="{18BDFEC3-8487-43E8-A154-7C12CBC1FFF2}" type="slidenum">
               <a:rPr lang="en-US"/>
-              <a:t>52</a:t>
+              <a:t>51</a:t>
             </a:fld>
             <a:endParaRPr lang="en-US"/>
           </a:p>
@@ -6532,15 +6854,6 @@
             <a:r>
               <a:rPr/>
               <a:t> is telling you that 4 is the first value in a sequence returned by R.</a:t>
-            </a:r>
-          </a:p>
-          <a:p>
-            <a:pPr lvl="0" marL="0" indent="0">
-              <a:buNone/>
-            </a:pPr>
-            <a:r>
-              <a:rPr/>
-              <a:t>::: notes Say that the ## sign is just printed on the slide as an indicator that we are seeing output rather than code entered. They shouldn’t see the symbol on their consoles.</a:t>
             </a:r>
           </a:p>
         </p:txBody>

</xml_diff>

<commit_message>
Added a couple of notes to workshop 1.
</commit_message>
<xml_diff>
--- a/Workshops/Workshop1.pptx
+++ b/Workshops/Workshop1.pptx
@@ -751,6 +751,224 @@
             </a:pPr>
             <a:r>
               <a:rPr/>
+              <a:t>Get</a:t>
+            </a:r>
+            <a:r>
+              <a:rPr/>
+              <a:t> </a:t>
+            </a:r>
+            <a:r>
+              <a:rPr/>
+              <a:t>them</a:t>
+            </a:r>
+            <a:r>
+              <a:rPr/>
+              <a:t> </a:t>
+            </a:r>
+            <a:r>
+              <a:rPr/>
+              <a:t>to</a:t>
+            </a:r>
+            <a:r>
+              <a:rPr/>
+              <a:t> </a:t>
+            </a:r>
+            <a:r>
+              <a:rPr/>
+              <a:t>load</a:t>
+            </a:r>
+            <a:r>
+              <a:rPr/>
+              <a:t> </a:t>
+            </a:r>
+            <a:r>
+              <a:rPr/>
+              <a:t>tidyverse.</a:t>
+            </a:r>
+            <a:r>
+              <a:rPr/>
+              <a:t> </a:t>
+            </a:r>
+            <a:r>
+              <a:rPr/>
+              <a:t>Emphasise</a:t>
+            </a:r>
+            <a:r>
+              <a:rPr/>
+              <a:t> </a:t>
+            </a:r>
+            <a:r>
+              <a:rPr/>
+              <a:t>that</a:t>
+            </a:r>
+            <a:r>
+              <a:rPr/>
+              <a:t> </a:t>
+            </a:r>
+            <a:r>
+              <a:rPr/>
+              <a:t>this</a:t>
+            </a:r>
+            <a:r>
+              <a:rPr/>
+              <a:t> </a:t>
+            </a:r>
+            <a:r>
+              <a:rPr/>
+              <a:t>is</a:t>
+            </a:r>
+            <a:r>
+              <a:rPr/>
+              <a:t> </a:t>
+            </a:r>
+            <a:r>
+              <a:rPr/>
+              <a:t>a</a:t>
+            </a:r>
+            <a:r>
+              <a:rPr/>
+              <a:t> </a:t>
+            </a:r>
+            <a:r>
+              <a:rPr/>
+              <a:t>process</a:t>
+            </a:r>
+            <a:r>
+              <a:rPr/>
+              <a:t> </a:t>
+            </a:r>
+            <a:r>
+              <a:rPr/>
+              <a:t>we</a:t>
+            </a:r>
+            <a:r>
+              <a:rPr/>
+              <a:t> </a:t>
+            </a:r>
+            <a:r>
+              <a:rPr/>
+              <a:t>will</a:t>
+            </a:r>
+            <a:r>
+              <a:rPr/>
+              <a:t> </a:t>
+            </a:r>
+            <a:r>
+              <a:rPr/>
+              <a:t>keep</a:t>
+            </a:r>
+            <a:r>
+              <a:rPr/>
+              <a:t> </a:t>
+            </a:r>
+            <a:r>
+              <a:rPr/>
+              <a:t>repeating</a:t>
+            </a:r>
+            <a:r>
+              <a:rPr/>
+              <a:t> </a:t>
+            </a:r>
+            <a:r>
+              <a:rPr/>
+              <a:t>throughout</a:t>
+            </a:r>
+            <a:r>
+              <a:rPr/>
+              <a:t> </a:t>
+            </a:r>
+            <a:r>
+              <a:rPr/>
+              <a:t>the</a:t>
+            </a:r>
+            <a:r>
+              <a:rPr/>
+              <a:t> </a:t>
+            </a:r>
+            <a:r>
+              <a:rPr/>
+              <a:t>course.</a:t>
+            </a:r>
+          </a:p>
+        </p:txBody>
+      </p:sp>
+      <p:sp>
+        <p:nvSpPr>
+          <p:cNvPr id="4" name="Slide Number Placeholder 3"/>
+          <p:cNvSpPr>
+            <a:spLocks noGrp="1"/>
+          </p:cNvSpPr>
+          <p:nvPr>
+            <p:ph type="sldNum" sz="quarter" idx="10"/>
+          </p:nvPr>
+        </p:nvSpPr>
+        <p:spPr/>
+        <p:txBody>
+          <a:bodyPr/>
+          <a:lstStyle/>
+          <a:p>
+            <a:fld id="{18BDFEC3-8487-43E8-A154-7C12CBC1FFF2}" type="slidenum">
+              <a:rPr lang="en-US"/>
+              <a:t>51</a:t>
+            </a:fld>
+            <a:endParaRPr lang="en-US"/>
+          </a:p>
+        </p:txBody>
+      </p:sp>
+    </p:spTree>
+  </p:cSld>
+</p:notes>
+</file>
+
+<file path=ppt/notesSlides/notesSlide11.xml><?xml version="1.0" encoding="utf-8"?>
+<p:notes xmlns:a="http://schemas.openxmlformats.org/drawingml/2006/main" xmlns:r="http://schemas.openxmlformats.org/officeDocument/2006/relationships" xmlns:p="http://schemas.openxmlformats.org/presentationml/2006/main">
+  <p:cSld>
+    <p:spTree>
+      <p:nvGrpSpPr>
+        <p:cNvPr id="1" name=""/>
+        <p:cNvGrpSpPr/>
+        <p:nvPr/>
+      </p:nvGrpSpPr>
+      <p:grpSpPr>
+        <a:xfrm>
+          <a:off x="0" y="0"/>
+          <a:ext cx="0" cy="0"/>
+          <a:chOff x="0" y="0"/>
+          <a:chExt cx="0" cy="0"/>
+        </a:xfrm>
+      </p:grpSpPr>
+      <p:sp>
+        <p:nvSpPr>
+          <p:cNvPr id="2" name="Slide Image Placeholder 1"/>
+          <p:cNvSpPr>
+            <a:spLocks noGrp="1" noRot="1" noChangeAspect="1"/>
+          </p:cNvSpPr>
+          <p:nvPr>
+            <p:ph type="sldImg"/>
+          </p:nvPr>
+        </p:nvSpPr>
+        <p:spPr/>
+      </p:sp>
+      <p:sp>
+        <p:nvSpPr>
+          <p:cNvPr id="3" name="Notes Placeholder 2"/>
+          <p:cNvSpPr>
+            <a:spLocks noGrp="1"/>
+          </p:cNvSpPr>
+          <p:nvPr>
+            <p:ph type="body" idx="1"/>
+          </p:nvPr>
+        </p:nvSpPr>
+        <p:spPr/>
+        <p:txBody>
+          <a:bodyPr/>
+          <a:lstStyle/>
+          <a:p>
+            <a:pPr lvl="0" marL="0" indent="0">
+              <a:buNone/>
+            </a:pPr>
+            <a:r>
+              <a:rPr/>
               <a:t>Maybe</a:t>
             </a:r>
             <a:r>
@@ -1913,6 +2131,512 @@
               <a:rPr/>
               <a:t>this.</a:t>
             </a:r>
+            <a:r>
+              <a:rPr/>
+              <a:t> </a:t>
+            </a:r>
+            <a:r>
+              <a:rPr/>
+              <a:t>?Use</a:t>
+            </a:r>
+            <a:r>
+              <a:rPr/>
+              <a:t> </a:t>
+            </a:r>
+            <a:r>
+              <a:rPr/>
+              <a:t>this</a:t>
+            </a:r>
+            <a:r>
+              <a:rPr/>
+              <a:t> </a:t>
+            </a:r>
+            <a:r>
+              <a:rPr/>
+              <a:t>to</a:t>
+            </a:r>
+            <a:r>
+              <a:rPr/>
+              <a:t> </a:t>
+            </a:r>
+            <a:r>
+              <a:rPr/>
+              <a:t>introduce</a:t>
+            </a:r>
+            <a:r>
+              <a:rPr/>
+              <a:t> </a:t>
+            </a:r>
+            <a:r>
+              <a:rPr/>
+              <a:t>the</a:t>
+            </a:r>
+            <a:r>
+              <a:rPr/>
+              <a:t> </a:t>
+            </a:r>
+            <a:r>
+              <a:rPr/>
+              <a:t>labbook</a:t>
+            </a:r>
+            <a:r>
+              <a:rPr/>
+              <a:t> </a:t>
+            </a:r>
+            <a:r>
+              <a:rPr/>
+              <a:t>idea?</a:t>
+            </a:r>
+            <a:r>
+              <a:rPr/>
+              <a:t> </a:t>
+            </a:r>
+            <a:r>
+              <a:rPr/>
+              <a:t>Every</a:t>
+            </a:r>
+            <a:r>
+              <a:rPr/>
+              <a:t> </a:t>
+            </a:r>
+            <a:r>
+              <a:rPr/>
+              <a:t>scientist</a:t>
+            </a:r>
+            <a:r>
+              <a:rPr/>
+              <a:t> </a:t>
+            </a:r>
+            <a:r>
+              <a:rPr/>
+              <a:t>is</a:t>
+            </a:r>
+            <a:r>
+              <a:rPr/>
+              <a:t> </a:t>
+            </a:r>
+            <a:r>
+              <a:rPr/>
+              <a:t>expected</a:t>
+            </a:r>
+            <a:r>
+              <a:rPr/>
+              <a:t> </a:t>
+            </a:r>
+            <a:r>
+              <a:rPr/>
+              <a:t>to</a:t>
+            </a:r>
+            <a:r>
+              <a:rPr/>
+              <a:t> </a:t>
+            </a:r>
+            <a:r>
+              <a:rPr/>
+              <a:t>maintain</a:t>
+            </a:r>
+            <a:r>
+              <a:rPr/>
+              <a:t> </a:t>
+            </a:r>
+            <a:r>
+              <a:rPr/>
+              <a:t>a</a:t>
+            </a:r>
+            <a:r>
+              <a:rPr/>
+              <a:t> </a:t>
+            </a:r>
+            <a:r>
+              <a:rPr/>
+              <a:t>labbook</a:t>
+            </a:r>
+            <a:r>
+              <a:rPr/>
+              <a:t> </a:t>
+            </a:r>
+            <a:r>
+              <a:rPr/>
+              <a:t>and</a:t>
+            </a:r>
+            <a:r>
+              <a:rPr/>
+              <a:t> </a:t>
+            </a:r>
+            <a:r>
+              <a:rPr/>
+              <a:t>this</a:t>
+            </a:r>
+            <a:r>
+              <a:rPr/>
+              <a:t> </a:t>
+            </a:r>
+            <a:r>
+              <a:rPr/>
+              <a:t>should</a:t>
+            </a:r>
+            <a:r>
+              <a:rPr/>
+              <a:t> </a:t>
+            </a:r>
+            <a:r>
+              <a:rPr/>
+              <a:t>be</a:t>
+            </a:r>
+            <a:r>
+              <a:rPr/>
+              <a:t> </a:t>
+            </a:r>
+            <a:r>
+              <a:rPr/>
+              <a:t>no</a:t>
+            </a:r>
+            <a:r>
+              <a:rPr/>
+              <a:t> </a:t>
+            </a:r>
+            <a:r>
+              <a:rPr/>
+              <a:t>different</a:t>
+            </a:r>
+            <a:r>
+              <a:rPr/>
+              <a:t> </a:t>
+            </a:r>
+            <a:r>
+              <a:rPr/>
+              <a:t>for</a:t>
+            </a:r>
+            <a:r>
+              <a:rPr/>
+              <a:t> </a:t>
+            </a:r>
+            <a:r>
+              <a:rPr/>
+              <a:t>a</a:t>
+            </a:r>
+            <a:r>
+              <a:rPr/>
+              <a:t> </a:t>
+            </a:r>
+            <a:r>
+              <a:rPr/>
+              <a:t>data</a:t>
+            </a:r>
+            <a:r>
+              <a:rPr/>
+              <a:t> </a:t>
+            </a:r>
+            <a:r>
+              <a:rPr/>
+              <a:t>scientist;</a:t>
+            </a:r>
+            <a:r>
+              <a:rPr/>
+              <a:t> </a:t>
+            </a:r>
+            <a:r>
+              <a:rPr/>
+              <a:t>so</a:t>
+            </a:r>
+            <a:r>
+              <a:rPr/>
+              <a:t> </a:t>
+            </a:r>
+            <a:r>
+              <a:rPr/>
+              <a:t>each</a:t>
+            </a:r>
+            <a:r>
+              <a:rPr/>
+              <a:t> </a:t>
+            </a:r>
+            <a:r>
+              <a:rPr/>
+              <a:t>time</a:t>
+            </a:r>
+            <a:r>
+              <a:rPr/>
+              <a:t> </a:t>
+            </a:r>
+            <a:r>
+              <a:rPr/>
+              <a:t>you</a:t>
+            </a:r>
+            <a:r>
+              <a:rPr/>
+              <a:t> </a:t>
+            </a:r>
+            <a:r>
+              <a:rPr/>
+              <a:t>sit</a:t>
+            </a:r>
+            <a:r>
+              <a:rPr/>
+              <a:t> </a:t>
+            </a:r>
+            <a:r>
+              <a:rPr/>
+              <a:t>down</a:t>
+            </a:r>
+            <a:r>
+              <a:rPr/>
+              <a:t> </a:t>
+            </a:r>
+            <a:r>
+              <a:rPr/>
+              <a:t>to</a:t>
+            </a:r>
+            <a:r>
+              <a:rPr/>
+              <a:t> </a:t>
+            </a:r>
+            <a:r>
+              <a:rPr/>
+              <a:t>work</a:t>
+            </a:r>
+            <a:r>
+              <a:rPr/>
+              <a:t> </a:t>
+            </a:r>
+            <a:r>
+              <a:rPr/>
+              <a:t>create</a:t>
+            </a:r>
+            <a:r>
+              <a:rPr/>
+              <a:t> </a:t>
+            </a:r>
+            <a:r>
+              <a:rPr/>
+              <a:t>a</a:t>
+            </a:r>
+            <a:r>
+              <a:rPr/>
+              <a:t> </a:t>
+            </a:r>
+            <a:r>
+              <a:rPr/>
+              <a:t>new</a:t>
+            </a:r>
+            <a:r>
+              <a:rPr/>
+              <a:t> </a:t>
+            </a:r>
+            <a:r>
+              <a:rPr/>
+              <a:t>file;</a:t>
+            </a:r>
+            <a:r>
+              <a:rPr/>
+              <a:t> </a:t>
+            </a:r>
+            <a:r>
+              <a:rPr/>
+              <a:t>I</a:t>
+            </a:r>
+            <a:r>
+              <a:rPr/>
+              <a:t> </a:t>
+            </a:r>
+            <a:r>
+              <a:rPr/>
+              <a:t>do</a:t>
+            </a:r>
+            <a:r>
+              <a:rPr/>
+              <a:t> </a:t>
+            </a:r>
+            <a:r>
+              <a:rPr/>
+              <a:t>this</a:t>
+            </a:r>
+            <a:r>
+              <a:rPr/>
+              <a:t> </a:t>
+            </a:r>
+            <a:r>
+              <a:rPr/>
+              <a:t>by</a:t>
+            </a:r>
+            <a:r>
+              <a:rPr/>
+              <a:t> </a:t>
+            </a:r>
+            <a:r>
+              <a:rPr/>
+              <a:t>creating</a:t>
+            </a:r>
+            <a:r>
+              <a:rPr/>
+              <a:t> </a:t>
+            </a:r>
+            <a:r>
+              <a:rPr/>
+              <a:t>a</a:t>
+            </a:r>
+            <a:r>
+              <a:rPr/>
+              <a:t> </a:t>
+            </a:r>
+            <a:r>
+              <a:rPr/>
+              <a:t>directory</a:t>
+            </a:r>
+            <a:r>
+              <a:rPr/>
+              <a:t> </a:t>
+            </a:r>
+            <a:r>
+              <a:rPr/>
+              <a:t>in</a:t>
+            </a:r>
+            <a:r>
+              <a:rPr/>
+              <a:t> </a:t>
+            </a:r>
+            <a:r>
+              <a:rPr/>
+              <a:t>each</a:t>
+            </a:r>
+            <a:r>
+              <a:rPr/>
+              <a:t> </a:t>
+            </a:r>
+            <a:r>
+              <a:rPr/>
+              <a:t>project</a:t>
+            </a:r>
+            <a:r>
+              <a:rPr/>
+              <a:t> </a:t>
+            </a:r>
+            <a:r>
+              <a:rPr/>
+              <a:t>called</a:t>
+            </a:r>
+            <a:r>
+              <a:rPr/>
+              <a:t> </a:t>
+            </a:r>
+            <a:r>
+              <a:rPr/>
+              <a:t>labbooks</a:t>
+            </a:r>
+            <a:r>
+              <a:rPr/>
+              <a:t> </a:t>
+            </a:r>
+            <a:r>
+              <a:rPr/>
+              <a:t>and</a:t>
+            </a:r>
+            <a:r>
+              <a:rPr/>
+              <a:t> </a:t>
+            </a:r>
+            <a:r>
+              <a:rPr/>
+              <a:t>then</a:t>
+            </a:r>
+            <a:r>
+              <a:rPr/>
+              <a:t> </a:t>
+            </a:r>
+            <a:r>
+              <a:rPr/>
+              <a:t>files</a:t>
+            </a:r>
+            <a:r>
+              <a:rPr/>
+              <a:t> </a:t>
+            </a:r>
+            <a:r>
+              <a:rPr/>
+              <a:t>named</a:t>
+            </a:r>
+            <a:r>
+              <a:rPr/>
+              <a:t> </a:t>
+            </a:r>
+            <a:r>
+              <a:rPr/>
+              <a:t>according</a:t>
+            </a:r>
+            <a:r>
+              <a:rPr/>
+              <a:t> </a:t>
+            </a:r>
+            <a:r>
+              <a:rPr/>
+              <a:t>as</a:t>
+            </a:r>
+            <a:r>
+              <a:rPr/>
+              <a:t> </a:t>
+            </a:r>
+            <a:r>
+              <a:rPr sz="1800">
+                <a:latin typeface="Courier"/>
+              </a:rPr>
+              <a:t>CCYY-MM-DD.R</a:t>
+            </a:r>
+            <a:r>
+              <a:rPr/>
+              <a:t> </a:t>
+            </a:r>
+            <a:r>
+              <a:rPr/>
+              <a:t>See</a:t>
+            </a:r>
+            <a:r>
+              <a:rPr/>
+              <a:t> </a:t>
+            </a:r>
+            <a:r>
+              <a:rPr/>
+              <a:t>-</a:t>
+            </a:r>
+            <a:r>
+              <a:rPr/>
+              <a:t> </a:t>
+            </a:r>
+            <a:r>
+              <a:rPr/>
+              <a:t>https://www.training.nih.gov/assets/Lab_Notebook_508_(new).pdf</a:t>
+            </a:r>
+            <a:r>
+              <a:rPr/>
+              <a:t> </a:t>
+            </a:r>
+            <a:r>
+              <a:rPr/>
+              <a:t>-</a:t>
+            </a:r>
+            <a:r>
+              <a:rPr/>
+              <a:t> </a:t>
+            </a:r>
+            <a:r>
+              <a:rPr/>
+              <a:t>http://www3.imperial.ac.uk/pls/portallive/docs/1/7289716.PDF</a:t>
+            </a:r>
+            <a:r>
+              <a:rPr/>
+              <a:t> </a:t>
+            </a:r>
+            <a:r>
+              <a:rPr/>
+              <a:t>-</a:t>
+            </a:r>
+            <a:r>
+              <a:rPr/>
+              <a:t> </a:t>
+            </a:r>
+            <a:r>
+              <a:rPr/>
+              <a:t>https://en.wikipedia.org/wiki/Lab_notebook</a:t>
+            </a:r>
           </a:p>
         </p:txBody>
       </p:sp>
@@ -2261,15 +2985,7 @@
             </a:pPr>
             <a:r>
               <a:rPr/>
-              <a:t>Work</a:t>
-            </a:r>
-            <a:r>
-              <a:rPr/>
-              <a:t> </a:t>
-            </a:r>
-            <a:r>
-              <a:rPr/>
-              <a:t>through</a:t>
+              <a:t>reference</a:t>
             </a:r>
             <a:r>
               <a:rPr/>
@@ -2285,15 +3001,135 @@
             </a:r>
             <a:r>
               <a:rPr/>
-              <a:t>with</a:t>
-            </a:r>
-            <a:r>
-              <a:rPr/>
-              <a:t> </a:t>
-            </a:r>
-            <a:r>
-              <a:rPr/>
-              <a:t>them.</a:t>
+              <a:t>back</a:t>
+            </a:r>
+            <a:r>
+              <a:rPr/>
+              <a:t> </a:t>
+            </a:r>
+            <a:r>
+              <a:rPr/>
+              <a:t>to</a:t>
+            </a:r>
+            <a:r>
+              <a:rPr/>
+              <a:t> </a:t>
+            </a:r>
+            <a:r>
+              <a:rPr/>
+              <a:t>the</a:t>
+            </a:r>
+            <a:r>
+              <a:rPr/>
+              <a:t> </a:t>
+            </a:r>
+            <a:r>
+              <a:rPr/>
+              <a:t>factory</a:t>
+            </a:r>
+            <a:r>
+              <a:rPr/>
+              <a:t> </a:t>
+            </a:r>
+            <a:r>
+              <a:rPr/>
+              <a:t>idea</a:t>
+            </a:r>
+            <a:r>
+              <a:rPr/>
+              <a:t> </a:t>
+            </a:r>
+            <a:r>
+              <a:rPr/>
+              <a:t>argument</a:t>
+            </a:r>
+            <a:r>
+              <a:rPr/>
+              <a:t> </a:t>
+            </a:r>
+            <a:r>
+              <a:rPr/>
+              <a:t>=</a:t>
+            </a:r>
+            <a:r>
+              <a:rPr/>
+              <a:t> </a:t>
+            </a:r>
+            <a:r>
+              <a:rPr/>
+              <a:t>names</a:t>
+            </a:r>
+            <a:r>
+              <a:rPr/>
+              <a:t> </a:t>
+            </a:r>
+            <a:r>
+              <a:rPr/>
+              <a:t>of</a:t>
+            </a:r>
+            <a:r>
+              <a:rPr/>
+              <a:t> </a:t>
+            </a:r>
+            <a:r>
+              <a:rPr/>
+              <a:t>the</a:t>
+            </a:r>
+            <a:r>
+              <a:rPr/>
+              <a:t> </a:t>
+            </a:r>
+            <a:r>
+              <a:rPr/>
+              <a:t>inputs</a:t>
+            </a:r>
+            <a:r>
+              <a:rPr/>
+              <a:t> </a:t>
+            </a:r>
+            <a:r>
+              <a:rPr/>
+              <a:t>function</a:t>
+            </a:r>
+            <a:r>
+              <a:rPr/>
+              <a:t> </a:t>
+            </a:r>
+            <a:r>
+              <a:rPr/>
+              <a:t>=</a:t>
+            </a:r>
+            <a:r>
+              <a:rPr/>
+              <a:t> </a:t>
+            </a:r>
+            <a:r>
+              <a:rPr/>
+              <a:t>machine/factory</a:t>
+            </a:r>
+            <a:r>
+              <a:rPr/>
+              <a:t> </a:t>
+            </a:r>
+            <a:r>
+              <a:rPr/>
+              <a:t>value</a:t>
+            </a:r>
+            <a:r>
+              <a:rPr/>
+              <a:t> </a:t>
+            </a:r>
+            <a:r>
+              <a:rPr/>
+              <a:t>=</a:t>
+            </a:r>
+            <a:r>
+              <a:rPr/>
+              <a:t> </a:t>
+            </a:r>
+            <a:r>
+              <a:rPr/>
+              <a:t>output</a:t>
             </a:r>
           </a:p>
         </p:txBody>
@@ -2315,7 +3151,7 @@
           <a:p>
             <a:fld id="{18BDFEC3-8487-43E8-A154-7C12CBC1FFF2}" type="slidenum">
               <a:rPr lang="en-US"/>
-              <a:t>50</a:t>
+              <a:t>49</a:t>
             </a:fld>
             <a:endParaRPr lang="en-US"/>
           </a:p>
@@ -2375,55 +3211,15 @@
             </a:pPr>
             <a:r>
               <a:rPr/>
-              <a:t>Get</a:t>
-            </a:r>
-            <a:r>
-              <a:rPr/>
-              <a:t> </a:t>
-            </a:r>
-            <a:r>
-              <a:rPr/>
-              <a:t>them</a:t>
-            </a:r>
-            <a:r>
-              <a:rPr/>
-              <a:t> </a:t>
-            </a:r>
-            <a:r>
-              <a:rPr/>
-              <a:t>to</a:t>
-            </a:r>
-            <a:r>
-              <a:rPr/>
-              <a:t> </a:t>
-            </a:r>
-            <a:r>
-              <a:rPr/>
-              <a:t>load</a:t>
-            </a:r>
-            <a:r>
-              <a:rPr/>
-              <a:t> </a:t>
-            </a:r>
-            <a:r>
-              <a:rPr/>
-              <a:t>tidyverse.</a:t>
-            </a:r>
-            <a:r>
-              <a:rPr/>
-              <a:t> </a:t>
-            </a:r>
-            <a:r>
-              <a:rPr/>
-              <a:t>Emphasise</a:t>
-            </a:r>
-            <a:r>
-              <a:rPr/>
-              <a:t> </a:t>
-            </a:r>
-            <a:r>
-              <a:rPr/>
-              <a:t>that</a:t>
+              <a:t>Work</a:t>
+            </a:r>
+            <a:r>
+              <a:rPr/>
+              <a:t> </a:t>
+            </a:r>
+            <a:r>
+              <a:rPr/>
+              <a:t>through</a:t>
             </a:r>
             <a:r>
               <a:rPr/>
@@ -2439,79 +3235,15 @@
             </a:r>
             <a:r>
               <a:rPr/>
-              <a:t>is</a:t>
-            </a:r>
-            <a:r>
-              <a:rPr/>
-              <a:t> </a:t>
-            </a:r>
-            <a:r>
-              <a:rPr/>
-              <a:t>a</a:t>
-            </a:r>
-            <a:r>
-              <a:rPr/>
-              <a:t> </a:t>
-            </a:r>
-            <a:r>
-              <a:rPr/>
-              <a:t>process</a:t>
-            </a:r>
-            <a:r>
-              <a:rPr/>
-              <a:t> </a:t>
-            </a:r>
-            <a:r>
-              <a:rPr/>
-              <a:t>we</a:t>
-            </a:r>
-            <a:r>
-              <a:rPr/>
-              <a:t> </a:t>
-            </a:r>
-            <a:r>
-              <a:rPr/>
-              <a:t>will</a:t>
-            </a:r>
-            <a:r>
-              <a:rPr/>
-              <a:t> </a:t>
-            </a:r>
-            <a:r>
-              <a:rPr/>
-              <a:t>keep</a:t>
-            </a:r>
-            <a:r>
-              <a:rPr/>
-              <a:t> </a:t>
-            </a:r>
-            <a:r>
-              <a:rPr/>
-              <a:t>repeating</a:t>
-            </a:r>
-            <a:r>
-              <a:rPr/>
-              <a:t> </a:t>
-            </a:r>
-            <a:r>
-              <a:rPr/>
-              <a:t>throughout</a:t>
-            </a:r>
-            <a:r>
-              <a:rPr/>
-              <a:t> </a:t>
-            </a:r>
-            <a:r>
-              <a:rPr/>
-              <a:t>the</a:t>
-            </a:r>
-            <a:r>
-              <a:rPr/>
-              <a:t> </a:t>
-            </a:r>
-            <a:r>
-              <a:rPr/>
-              <a:t>course.</a:t>
+              <a:t>with</a:t>
+            </a:r>
+            <a:r>
+              <a:rPr/>
+              <a:t> </a:t>
+            </a:r>
+            <a:r>
+              <a:rPr/>
+              <a:t>them.</a:t>
             </a:r>
           </a:p>
         </p:txBody>
@@ -2533,7 +3265,7 @@
           <a:p>
             <a:fld id="{18BDFEC3-8487-43E8-A154-7C12CBC1FFF2}" type="slidenum">
               <a:rPr lang="en-US"/>
-              <a:t>51</a:t>
+              <a:t>50</a:t>
             </a:fld>
             <a:endParaRPr lang="en-US"/>
           </a:p>

</xml_diff>